<commit_message>
pilot study changes. 20 total targets, 15:5 ratio
</commit_message>
<xml_diff>
--- a/ppt.pptx
+++ b/ppt.pptx
@@ -9,6 +9,7 @@
     <p:sldId id="257" r:id="rId3"/>
     <p:sldId id="258" r:id="rId4"/>
     <p:sldId id="259" r:id="rId5"/>
+    <p:sldId id="260" r:id="rId6"/>
   </p:sldIdLst>
   <p:sldSz cx="12192000" cy="6858000"/>
   <p:notesSz cx="6858000" cy="9144000"/>
@@ -246,7 +247,7 @@
           <a:p>
             <a:fld id="{3FB2E474-B5A2-4FFA-86A0-70BE03424187}" type="datetimeFigureOut">
               <a:rPr lang="en-US" smtClean="0"/>
-              <a:t>18-Mar-17</a:t>
+              <a:t>26-Mar-17</a:t>
             </a:fld>
             <a:endParaRPr lang="en-US"/>
           </a:p>
@@ -416,7 +417,7 @@
           <a:p>
             <a:fld id="{3FB2E474-B5A2-4FFA-86A0-70BE03424187}" type="datetimeFigureOut">
               <a:rPr lang="en-US" smtClean="0"/>
-              <a:t>18-Mar-17</a:t>
+              <a:t>26-Mar-17</a:t>
             </a:fld>
             <a:endParaRPr lang="en-US"/>
           </a:p>
@@ -596,7 +597,7 @@
           <a:p>
             <a:fld id="{3FB2E474-B5A2-4FFA-86A0-70BE03424187}" type="datetimeFigureOut">
               <a:rPr lang="en-US" smtClean="0"/>
-              <a:t>18-Mar-17</a:t>
+              <a:t>26-Mar-17</a:t>
             </a:fld>
             <a:endParaRPr lang="en-US"/>
           </a:p>
@@ -766,7 +767,7 @@
           <a:p>
             <a:fld id="{3FB2E474-B5A2-4FFA-86A0-70BE03424187}" type="datetimeFigureOut">
               <a:rPr lang="en-US" smtClean="0"/>
-              <a:t>18-Mar-17</a:t>
+              <a:t>26-Mar-17</a:t>
             </a:fld>
             <a:endParaRPr lang="en-US"/>
           </a:p>
@@ -1012,7 +1013,7 @@
           <a:p>
             <a:fld id="{3FB2E474-B5A2-4FFA-86A0-70BE03424187}" type="datetimeFigureOut">
               <a:rPr lang="en-US" smtClean="0"/>
-              <a:t>18-Mar-17</a:t>
+              <a:t>26-Mar-17</a:t>
             </a:fld>
             <a:endParaRPr lang="en-US"/>
           </a:p>
@@ -1244,7 +1245,7 @@
           <a:p>
             <a:fld id="{3FB2E474-B5A2-4FFA-86A0-70BE03424187}" type="datetimeFigureOut">
               <a:rPr lang="en-US" smtClean="0"/>
-              <a:t>18-Mar-17</a:t>
+              <a:t>26-Mar-17</a:t>
             </a:fld>
             <a:endParaRPr lang="en-US"/>
           </a:p>
@@ -1611,7 +1612,7 @@
           <a:p>
             <a:fld id="{3FB2E474-B5A2-4FFA-86A0-70BE03424187}" type="datetimeFigureOut">
               <a:rPr lang="en-US" smtClean="0"/>
-              <a:t>18-Mar-17</a:t>
+              <a:t>26-Mar-17</a:t>
             </a:fld>
             <a:endParaRPr lang="en-US"/>
           </a:p>
@@ -1729,7 +1730,7 @@
           <a:p>
             <a:fld id="{3FB2E474-B5A2-4FFA-86A0-70BE03424187}" type="datetimeFigureOut">
               <a:rPr lang="en-US" smtClean="0"/>
-              <a:t>18-Mar-17</a:t>
+              <a:t>26-Mar-17</a:t>
             </a:fld>
             <a:endParaRPr lang="en-US"/>
           </a:p>
@@ -1824,7 +1825,7 @@
           <a:p>
             <a:fld id="{3FB2E474-B5A2-4FFA-86A0-70BE03424187}" type="datetimeFigureOut">
               <a:rPr lang="en-US" smtClean="0"/>
-              <a:t>18-Mar-17</a:t>
+              <a:t>26-Mar-17</a:t>
             </a:fld>
             <a:endParaRPr lang="en-US"/>
           </a:p>
@@ -2101,7 +2102,7 @@
           <a:p>
             <a:fld id="{3FB2E474-B5A2-4FFA-86A0-70BE03424187}" type="datetimeFigureOut">
               <a:rPr lang="en-US" smtClean="0"/>
-              <a:t>18-Mar-17</a:t>
+              <a:t>26-Mar-17</a:t>
             </a:fld>
             <a:endParaRPr lang="en-US"/>
           </a:p>
@@ -2354,7 +2355,7 @@
           <a:p>
             <a:fld id="{3FB2E474-B5A2-4FFA-86A0-70BE03424187}" type="datetimeFigureOut">
               <a:rPr lang="en-US" smtClean="0"/>
-              <a:t>18-Mar-17</a:t>
+              <a:t>26-Mar-17</a:t>
             </a:fld>
             <a:endParaRPr lang="en-US"/>
           </a:p>
@@ -2567,7 +2568,7 @@
           <a:p>
             <a:fld id="{3FB2E474-B5A2-4FFA-86A0-70BE03424187}" type="datetimeFigureOut">
               <a:rPr lang="en-US" smtClean="0"/>
-              <a:t>18-Mar-17</a:t>
+              <a:t>26-Mar-17</a:t>
             </a:fld>
             <a:endParaRPr lang="en-US"/>
           </a:p>
@@ -3012,7 +3013,7 @@
       </p:sp>
       <p:pic>
         <p:nvPicPr>
-          <p:cNvPr id="5" name="Picture 4"/>
+          <p:cNvPr id="6" name="Picture 5"/>
           <p:cNvPicPr>
             <a:picLocks noChangeAspect="1"/>
           </p:cNvPicPr>
@@ -3032,8 +3033,8 @@
         </p:blipFill>
         <p:spPr>
           <a:xfrm>
-            <a:off x="2360429" y="-72538"/>
-            <a:ext cx="7527850" cy="6950715"/>
+            <a:off x="2319672" y="809570"/>
+            <a:ext cx="5849227" cy="5400786"/>
           </a:xfrm>
           <a:prstGeom prst="rect">
             <a:avLst/>
@@ -3085,19 +3086,36 @@
           <a:bodyPr/>
           <a:lstStyle/>
           <a:p>
+            <a:endParaRPr lang="en-US" dirty="0"/>
+          </a:p>
+        </p:txBody>
+      </p:sp>
+      <p:sp>
+        <p:nvSpPr>
+          <p:cNvPr id="3" name="Content Placeholder 2"/>
+          <p:cNvSpPr>
+            <a:spLocks noGrp="1"/>
+          </p:cNvSpPr>
+          <p:nvPr>
+            <p:ph idx="1"/>
+          </p:nvPr>
+        </p:nvSpPr>
+        <p:spPr/>
+        <p:txBody>
+          <a:bodyPr/>
+          <a:lstStyle/>
+          <a:p>
             <a:endParaRPr lang="en-US"/>
           </a:p>
         </p:txBody>
       </p:sp>
       <p:pic>
         <p:nvPicPr>
-          <p:cNvPr id="4" name="Content Placeholder 3"/>
+          <p:cNvPr id="7" name="Picture 6"/>
           <p:cNvPicPr>
-            <a:picLocks noGrp="1" noChangeAspect="1"/>
+            <a:picLocks noChangeAspect="1"/>
           </p:cNvPicPr>
-          <p:nvPr>
-            <p:ph idx="1"/>
-          </p:nvPr>
+          <p:nvPr/>
         </p:nvPicPr>
         <p:blipFill>
           <a:blip r:embed="rId2">
@@ -3113,15 +3131,18 @@
         </p:blipFill>
         <p:spPr>
           <a:xfrm>
-            <a:off x="1021173" y="0"/>
-            <a:ext cx="10332627" cy="6514048"/>
+            <a:off x="3064634" y="943713"/>
+            <a:ext cx="5808909" cy="3872606"/>
           </a:xfrm>
+          <a:prstGeom prst="rect">
+            <a:avLst/>
+          </a:prstGeom>
         </p:spPr>
       </p:pic>
     </p:spTree>
     <p:extLst>
       <p:ext uri="{BB962C8B-B14F-4D97-AF65-F5344CB8AC3E}">
-        <p14:creationId xmlns:p14="http://schemas.microsoft.com/office/powerpoint/2010/main" val="2955098983"/>
+        <p14:creationId xmlns:p14="http://schemas.microsoft.com/office/powerpoint/2010/main" val="110030709"/>
       </p:ext>
     </p:extLst>
   </p:cSld>
@@ -3163,19 +3184,36 @@
           <a:bodyPr/>
           <a:lstStyle/>
           <a:p>
+            <a:endParaRPr lang="en-US" dirty="0"/>
+          </a:p>
+        </p:txBody>
+      </p:sp>
+      <p:sp>
+        <p:nvSpPr>
+          <p:cNvPr id="3" name="Content Placeholder 2"/>
+          <p:cNvSpPr>
+            <a:spLocks noGrp="1"/>
+          </p:cNvSpPr>
+          <p:nvPr>
+            <p:ph idx="1"/>
+          </p:nvPr>
+        </p:nvSpPr>
+        <p:spPr/>
+        <p:txBody>
+          <a:bodyPr/>
+          <a:lstStyle/>
+          <a:p>
             <a:endParaRPr lang="en-US"/>
           </a:p>
         </p:txBody>
       </p:sp>
       <p:pic>
         <p:nvPicPr>
-          <p:cNvPr id="4" name="Content Placeholder 3"/>
+          <p:cNvPr id="5" name="Picture 4"/>
           <p:cNvPicPr>
-            <a:picLocks noGrp="1" noChangeAspect="1"/>
+            <a:picLocks noChangeAspect="1"/>
           </p:cNvPicPr>
-          <p:nvPr>
-            <p:ph idx="1"/>
-          </p:nvPr>
+          <p:nvPr/>
         </p:nvPicPr>
         <p:blipFill>
           <a:blip r:embed="rId2">
@@ -3191,15 +3229,18 @@
         </p:blipFill>
         <p:spPr>
           <a:xfrm>
-            <a:off x="3168503" y="75399"/>
-            <a:ext cx="7060018" cy="6707017"/>
+            <a:off x="3570533" y="1143804"/>
+            <a:ext cx="4646187" cy="4413878"/>
           </a:xfrm>
+          <a:prstGeom prst="rect">
+            <a:avLst/>
+          </a:prstGeom>
         </p:spPr>
       </p:pic>
     </p:spTree>
     <p:extLst>
       <p:ext uri="{BB962C8B-B14F-4D97-AF65-F5344CB8AC3E}">
-        <p14:creationId xmlns:p14="http://schemas.microsoft.com/office/powerpoint/2010/main" val="1953014055"/>
+        <p14:creationId xmlns:p14="http://schemas.microsoft.com/office/powerpoint/2010/main" val="3789896400"/>
       </p:ext>
     </p:extLst>
   </p:cSld>
@@ -3245,15 +3286,32 @@
           </a:p>
         </p:txBody>
       </p:sp>
+      <p:sp>
+        <p:nvSpPr>
+          <p:cNvPr id="3" name="Content Placeholder 2"/>
+          <p:cNvSpPr>
+            <a:spLocks noGrp="1"/>
+          </p:cNvSpPr>
+          <p:nvPr>
+            <p:ph idx="1"/>
+          </p:nvPr>
+        </p:nvSpPr>
+        <p:spPr/>
+        <p:txBody>
+          <a:bodyPr/>
+          <a:lstStyle/>
+          <a:p>
+            <a:endParaRPr lang="en-US"/>
+          </a:p>
+        </p:txBody>
+      </p:sp>
       <p:pic>
         <p:nvPicPr>
-          <p:cNvPr id="4" name="Content Placeholder 3"/>
+          <p:cNvPr id="4" name="Picture 3"/>
           <p:cNvPicPr>
-            <a:picLocks noGrp="1" noChangeAspect="1"/>
+            <a:picLocks noChangeAspect="1"/>
           </p:cNvPicPr>
-          <p:nvPr>
-            <p:ph idx="1"/>
-          </p:nvPr>
+          <p:nvPr/>
         </p:nvPicPr>
         <p:blipFill>
           <a:blip r:embed="rId2">
@@ -3269,15 +3327,116 @@
         </p:blipFill>
         <p:spPr>
           <a:xfrm>
-            <a:off x="649561" y="1360968"/>
-            <a:ext cx="10704239" cy="4763386"/>
+            <a:off x="1894670" y="1825625"/>
+            <a:ext cx="7519786" cy="3346305"/>
           </a:xfrm>
+          <a:prstGeom prst="rect">
+            <a:avLst/>
+          </a:prstGeom>
         </p:spPr>
       </p:pic>
     </p:spTree>
     <p:extLst>
       <p:ext uri="{BB962C8B-B14F-4D97-AF65-F5344CB8AC3E}">
-        <p14:creationId xmlns:p14="http://schemas.microsoft.com/office/powerpoint/2010/main" val="3455345539"/>
+        <p14:creationId xmlns:p14="http://schemas.microsoft.com/office/powerpoint/2010/main" val="3030901712"/>
+      </p:ext>
+    </p:extLst>
+  </p:cSld>
+  <p:clrMapOvr>
+    <a:masterClrMapping/>
+  </p:clrMapOvr>
+</p:sld>
+</file>
+
+<file path=ppt/slides/slide5.xml><?xml version="1.0" encoding="utf-8"?>
+<p:sld xmlns:a="http://schemas.openxmlformats.org/drawingml/2006/main" xmlns:r="http://schemas.openxmlformats.org/officeDocument/2006/relationships" xmlns:p="http://schemas.openxmlformats.org/presentationml/2006/main">
+  <p:cSld>
+    <p:spTree>
+      <p:nvGrpSpPr>
+        <p:cNvPr id="1" name=""/>
+        <p:cNvGrpSpPr/>
+        <p:nvPr/>
+      </p:nvGrpSpPr>
+      <p:grpSpPr>
+        <a:xfrm>
+          <a:off x="0" y="0"/>
+          <a:ext cx="0" cy="0"/>
+          <a:chOff x="0" y="0"/>
+          <a:chExt cx="0" cy="0"/>
+        </a:xfrm>
+      </p:grpSpPr>
+      <p:sp>
+        <p:nvSpPr>
+          <p:cNvPr id="2" name="Title 1"/>
+          <p:cNvSpPr>
+            <a:spLocks noGrp="1"/>
+          </p:cNvSpPr>
+          <p:nvPr>
+            <p:ph type="title"/>
+          </p:nvPr>
+        </p:nvSpPr>
+        <p:spPr/>
+        <p:txBody>
+          <a:bodyPr/>
+          <a:lstStyle/>
+          <a:p>
+            <a:endParaRPr lang="en-US"/>
+          </a:p>
+        </p:txBody>
+      </p:sp>
+      <p:sp>
+        <p:nvSpPr>
+          <p:cNvPr id="3" name="Content Placeholder 2"/>
+          <p:cNvSpPr>
+            <a:spLocks noGrp="1"/>
+          </p:cNvSpPr>
+          <p:nvPr>
+            <p:ph idx="1"/>
+          </p:nvPr>
+        </p:nvSpPr>
+        <p:spPr/>
+        <p:txBody>
+          <a:bodyPr/>
+          <a:lstStyle/>
+          <a:p>
+            <a:endParaRPr lang="en-US"/>
+          </a:p>
+        </p:txBody>
+      </p:sp>
+      <p:pic>
+        <p:nvPicPr>
+          <p:cNvPr id="4" name="Picture 3"/>
+          <p:cNvPicPr>
+            <a:picLocks noChangeAspect="1"/>
+          </p:cNvPicPr>
+          <p:nvPr/>
+        </p:nvPicPr>
+        <p:blipFill>
+          <a:blip r:embed="rId2">
+            <a:extLst>
+              <a:ext uri="{28A0092B-C50C-407E-A947-70E740481C1C}">
+                <a14:useLocalDpi xmlns:a14="http://schemas.microsoft.com/office/drawing/2010/main" val="0"/>
+              </a:ext>
+            </a:extLst>
+          </a:blip>
+          <a:stretch>
+            <a:fillRect/>
+          </a:stretch>
+        </p:blipFill>
+        <p:spPr>
+          <a:xfrm>
+            <a:off x="1882686" y="365125"/>
+            <a:ext cx="7995410" cy="6118936"/>
+          </a:xfrm>
+          <a:prstGeom prst="rect">
+            <a:avLst/>
+          </a:prstGeom>
+        </p:spPr>
+      </p:pic>
+    </p:spTree>
+    <p:extLst>
+      <p:ext uri="{BB962C8B-B14F-4D97-AF65-F5344CB8AC3E}">
+        <p14:creationId xmlns:p14="http://schemas.microsoft.com/office/powerpoint/2010/main" val="4210657079"/>
       </p:ext>
     </p:extLst>
   </p:cSld>

</xml_diff>